<commit_message>
adicionada estrutura para estatisticas
</commit_message>
<xml_diff>
--- a/diagrama/diagrama.pptx
+++ b/diagrama/diagrama.pptx
@@ -104,6 +104,11 @@
       </a:defRPr>
     </a:lvl9pPr>
   </p:defaultTextStyle>
+  <p:extLst>
+    <p:ext uri="{EFAFB233-063F-42B5-8137-9DF3F51BA10A}">
+      <p15:sldGuideLst xmlns:p15="http://schemas.microsoft.com/office/powerpoint/2012/main"/>
+    </p:ext>
+  </p:extLst>
 </p:presentation>
 </file>
 
@@ -5565,42 +5570,6 @@
       </p:sp>
       <p:pic>
         <p:nvPicPr>
-          <p:cNvPr id="108" name="Imagem 107">
-            <a:extLst>
-              <a:ext uri="{FF2B5EF4-FFF2-40B4-BE49-F238E27FC236}">
-                <a16:creationId xmlns:a16="http://schemas.microsoft.com/office/drawing/2014/main" id="{F1A6E5D5-DF2F-4D76-86D8-D64721C530CE}"/>
-              </a:ext>
-            </a:extLst>
-          </p:cNvPr>
-          <p:cNvPicPr>
-            <a:picLocks noChangeAspect="1"/>
-          </p:cNvPicPr>
-          <p:nvPr/>
-        </p:nvPicPr>
-        <p:blipFill>
-          <a:blip r:embed="rId2">
-            <a:extLst>
-              <a:ext uri="{28A0092B-C50C-407E-A947-70E740481C1C}">
-                <a14:useLocalDpi xmlns:a14="http://schemas.microsoft.com/office/drawing/2010/main" val="0"/>
-              </a:ext>
-            </a:extLst>
-          </a:blip>
-          <a:stretch>
-            <a:fillRect/>
-          </a:stretch>
-        </p:blipFill>
-        <p:spPr>
-          <a:xfrm>
-            <a:off x="10429703" y="4390724"/>
-            <a:ext cx="303389" cy="574331"/>
-          </a:xfrm>
-          <a:prstGeom prst="rect">
-            <a:avLst/>
-          </a:prstGeom>
-        </p:spPr>
-      </p:pic>
-      <p:pic>
-        <p:nvPicPr>
           <p:cNvPr id="109" name="Imagem 108">
             <a:extLst>
               <a:ext uri="{FF2B5EF4-FFF2-40B4-BE49-F238E27FC236}">
@@ -5824,8 +5793,8 @@
         </p:nvSpPr>
         <p:spPr>
           <a:xfrm>
-            <a:off x="7835737" y="4888735"/>
-            <a:ext cx="719091" cy="445369"/>
+            <a:off x="6913969" y="5560448"/>
+            <a:ext cx="873003" cy="393926"/>
           </a:xfrm>
           <a:prstGeom prst="flowChartDecision">
             <a:avLst/>
@@ -5852,7 +5821,81 @@
           <a:p>
             <a:pPr algn="ctr"/>
             <a:r>
-              <a:rPr lang="pt-PT" sz="1200" dirty="0">
+              <a:rPr lang="pt-PT" sz="1400" dirty="0">
+                <a:ln w="0"/>
+                <a:solidFill>
+                  <a:schemeClr val="tx1"/>
+                </a:solidFill>
+                <a:effectLst>
+                  <a:outerShdw blurRad="38100" dist="19050" dir="2700000" algn="tl" rotWithShape="0">
+                    <a:schemeClr val="dk1">
+                      <a:alpha val="40000"/>
+                    </a:schemeClr>
+                  </a:outerShdw>
+                </a:effectLst>
+              </a:rPr>
+              <a:t>MT</a:t>
+            </a:r>
+            <a:endParaRPr lang="pt-PT" sz="700" dirty="0">
+              <a:ln w="0"/>
+              <a:solidFill>
+                <a:schemeClr val="tx1"/>
+              </a:solidFill>
+              <a:effectLst>
+                <a:outerShdw blurRad="38100" dist="19050" dir="2700000" algn="tl" rotWithShape="0">
+                  <a:schemeClr val="dk1">
+                    <a:alpha val="40000"/>
+                  </a:schemeClr>
+                </a:outerShdw>
+              </a:effectLst>
+            </a:endParaRPr>
+          </a:p>
+        </p:txBody>
+      </p:sp>
+      <p:sp>
+        <p:nvSpPr>
+          <p:cNvPr id="2" name="Cubo 1">
+            <a:extLst>
+              <a:ext uri="{FF2B5EF4-FFF2-40B4-BE49-F238E27FC236}">
+                <a16:creationId xmlns:a16="http://schemas.microsoft.com/office/drawing/2014/main" id="{568E0D4E-4347-4D73-9D09-A3BEA3F1905A}"/>
+              </a:ext>
+            </a:extLst>
+          </p:cNvPr>
+          <p:cNvSpPr/>
+          <p:nvPr/>
+        </p:nvSpPr>
+        <p:spPr>
+          <a:xfrm>
+            <a:off x="7976595" y="4833694"/>
+            <a:ext cx="500117" cy="445369"/>
+          </a:xfrm>
+          <a:prstGeom prst="cube">
+            <a:avLst>
+              <a:gd name="adj" fmla="val 16882"/>
+            </a:avLst>
+          </a:prstGeom>
+        </p:spPr>
+        <p:style>
+          <a:lnRef idx="1">
+            <a:schemeClr val="accent2"/>
+          </a:lnRef>
+          <a:fillRef idx="2">
+            <a:schemeClr val="accent2"/>
+          </a:fillRef>
+          <a:effectRef idx="1">
+            <a:schemeClr val="accent2"/>
+          </a:effectRef>
+          <a:fontRef idx="minor">
+            <a:schemeClr val="dk1"/>
+          </a:fontRef>
+        </p:style>
+        <p:txBody>
+          <a:bodyPr rtlCol="0" anchor="ctr"/>
+          <a:lstStyle/>
+          <a:p>
+            <a:pPr algn="ctr"/>
+            <a:r>
+              <a:rPr lang="pt-PT" sz="1400" dirty="0">
                 <a:ln w="0"/>
                 <a:solidFill>
                   <a:schemeClr val="tx1"/>
@@ -5867,19 +5910,6 @@
               </a:rPr>
               <a:t>CV</a:t>
             </a:r>
-            <a:endParaRPr lang="pt-PT" dirty="0">
-              <a:ln w="0"/>
-              <a:solidFill>
-                <a:schemeClr val="tx1"/>
-              </a:solidFill>
-              <a:effectLst>
-                <a:outerShdw blurRad="38100" dist="19050" dir="2700000" algn="tl" rotWithShape="0">
-                  <a:schemeClr val="dk1">
-                    <a:alpha val="40000"/>
-                  </a:schemeClr>
-                </a:outerShdw>
-              </a:effectLst>
-            </a:endParaRPr>
           </a:p>
         </p:txBody>
       </p:sp>

</xml_diff>